<commit_message>
Project Background PPT changes
</commit_message>
<xml_diff>
--- a/presentataions/Presentation.pptx
+++ b/presentataions/Presentation.pptx
@@ -6,7 +6,7 @@
     <p:sldMasterId id="2147483661" r:id="rId2"/>
   </p:sldMasterIdLst>
   <p:notesMasterIdLst>
-    <p:notesMasterId r:id="rId14"/>
+    <p:notesMasterId r:id="rId17"/>
   </p:notesMasterIdLst>
   <p:sldIdLst>
     <p:sldId id="257" r:id="rId3"/>
@@ -16,10 +16,13 @@
     <p:sldId id="262" r:id="rId7"/>
     <p:sldId id="260" r:id="rId8"/>
     <p:sldId id="265" r:id="rId9"/>
-    <p:sldId id="288" r:id="rId10"/>
-    <p:sldId id="289" r:id="rId11"/>
-    <p:sldId id="290" r:id="rId12"/>
-    <p:sldId id="287" r:id="rId13"/>
+    <p:sldId id="293" r:id="rId10"/>
+    <p:sldId id="288" r:id="rId11"/>
+    <p:sldId id="289" r:id="rId12"/>
+    <p:sldId id="291" r:id="rId13"/>
+    <p:sldId id="292" r:id="rId14"/>
+    <p:sldId id="290" r:id="rId15"/>
+    <p:sldId id="287" r:id="rId16"/>
   </p:sldIdLst>
   <p:sldSz cx="12192000" cy="6858000"/>
   <p:notesSz cx="6858000" cy="9144000"/>
@@ -208,7 +211,7 @@
           <a:p>
             <a:fld id="{AD276A9C-E8FB-4187-B9E8-54A34F7E3A46}" type="datetimeFigureOut">
               <a:rPr lang="en-US" smtClean="0"/>
-              <a:t>3/2/2023</a:t>
+              <a:t>3/3/2023</a:t>
             </a:fld>
             <a:endParaRPr lang="en-US"/>
           </a:p>
@@ -1143,6 +1146,115 @@
         </p:spPr>
       </p:sp>
     </p:spTree>
+    <p:extLst>
+      <p:ext uri="{BB962C8B-B14F-4D97-AF65-F5344CB8AC3E}">
+        <p14:creationId xmlns:p14="http://schemas.microsoft.com/office/powerpoint/2010/main" val="2876899782"/>
+      </p:ext>
+    </p:extLst>
+  </p:cSld>
+  <p:clrMapOvr>
+    <a:masterClrMapping/>
+  </p:clrMapOvr>
+</p:notes>
+</file>
+
+<file path=ppt/notesSlides/notesSlide7.xml><?xml version="1.0" encoding="utf-8"?>
+<p:notes xmlns:a="http://schemas.openxmlformats.org/drawingml/2006/main" xmlns:r="http://schemas.openxmlformats.org/officeDocument/2006/relationships" xmlns:p="http://schemas.openxmlformats.org/presentationml/2006/main" showMasterSp="0" showMasterPhAnim="0">
+  <p:cSld>
+    <p:spTree>
+      <p:nvGrpSpPr>
+        <p:cNvPr id="1" name="Shape 347"/>
+        <p:cNvGrpSpPr/>
+        <p:nvPr/>
+      </p:nvGrpSpPr>
+      <p:grpSpPr>
+        <a:xfrm>
+          <a:off x="0" y="0"/>
+          <a:ext cx="0" cy="0"/>
+          <a:chOff x="0" y="0"/>
+          <a:chExt cx="0" cy="0"/>
+        </a:xfrm>
+      </p:grpSpPr>
+      <p:sp>
+        <p:nvSpPr>
+          <p:cNvPr id="348" name="Google Shape;348;g1aefe40ca71_2_2:notes"/>
+          <p:cNvSpPr txBox="1">
+            <a:spLocks noGrp="1"/>
+          </p:cNvSpPr>
+          <p:nvPr>
+            <p:ph type="body" idx="1"/>
+          </p:nvPr>
+        </p:nvSpPr>
+        <p:spPr>
+          <a:xfrm>
+            <a:off x="685800" y="4400550"/>
+            <a:ext cx="5486400" cy="3600600"/>
+          </a:xfrm>
+          <a:prstGeom prst="rect">
+            <a:avLst/>
+          </a:prstGeom>
+        </p:spPr>
+        <p:txBody>
+          <a:bodyPr spcFirstLastPara="1" wrap="square" lIns="91425" tIns="45700" rIns="91425" bIns="45700" anchor="t" anchorCtr="0">
+            <a:noAutofit/>
+          </a:bodyPr>
+          <a:lstStyle/>
+          <a:p>
+            <a:pPr marL="0" lvl="0" indent="0" algn="l" rtl="0">
+              <a:spcBef>
+                <a:spcPts val="0"/>
+              </a:spcBef>
+              <a:spcAft>
+                <a:spcPts val="0"/>
+              </a:spcAft>
+              <a:buNone/>
+            </a:pPr>
+            <a:endParaRPr/>
+          </a:p>
+        </p:txBody>
+      </p:sp>
+      <p:sp>
+        <p:nvSpPr>
+          <p:cNvPr id="349" name="Google Shape;349;g1aefe40ca71_2_2:notes"/>
+          <p:cNvSpPr>
+            <a:spLocks noGrp="1" noRot="1" noChangeAspect="1"/>
+          </p:cNvSpPr>
+          <p:nvPr>
+            <p:ph type="sldImg" idx="2"/>
+          </p:nvPr>
+        </p:nvSpPr>
+        <p:spPr>
+          <a:xfrm>
+            <a:off x="685800" y="1143000"/>
+            <a:ext cx="5486400" cy="3086100"/>
+          </a:xfrm>
+          <a:custGeom>
+            <a:avLst/>
+            <a:gdLst/>
+            <a:ahLst/>
+            <a:cxnLst/>
+            <a:rect l="l" t="t" r="r" b="b"/>
+            <a:pathLst>
+              <a:path w="120000" h="120000" extrusionOk="0">
+                <a:moveTo>
+                  <a:pt x="0" y="0"/>
+                </a:moveTo>
+                <a:lnTo>
+                  <a:pt x="120000" y="0"/>
+                </a:lnTo>
+                <a:lnTo>
+                  <a:pt x="120000" y="120000"/>
+                </a:lnTo>
+                <a:lnTo>
+                  <a:pt x="0" y="120000"/>
+                </a:lnTo>
+                <a:close/>
+              </a:path>
+            </a:pathLst>
+          </a:custGeom>
+        </p:spPr>
+      </p:sp>
+    </p:spTree>
   </p:cSld>
   <p:clrMapOvr>
     <a:masterClrMapping/>
@@ -1297,7 +1409,7 @@
           <a:p>
             <a:fld id="{6BAB3201-8CBA-4DCE-BDB9-4692BAE81E1A}" type="datetimeFigureOut">
               <a:rPr lang="en-US" smtClean="0"/>
-              <a:t>3/2/2023</a:t>
+              <a:t>3/3/2023</a:t>
             </a:fld>
             <a:endParaRPr lang="en-US"/>
           </a:p>
@@ -1495,7 +1607,7 @@
           <a:p>
             <a:fld id="{6BAB3201-8CBA-4DCE-BDB9-4692BAE81E1A}" type="datetimeFigureOut">
               <a:rPr lang="en-US" smtClean="0"/>
-              <a:t>3/2/2023</a:t>
+              <a:t>3/3/2023</a:t>
             </a:fld>
             <a:endParaRPr lang="en-US"/>
           </a:p>
@@ -1703,7 +1815,7 @@
           <a:p>
             <a:fld id="{6BAB3201-8CBA-4DCE-BDB9-4692BAE81E1A}" type="datetimeFigureOut">
               <a:rPr lang="en-US" smtClean="0"/>
-              <a:t>3/2/2023</a:t>
+              <a:t>3/3/2023</a:t>
             </a:fld>
             <a:endParaRPr lang="en-US"/>
           </a:p>
@@ -5860,7 +5972,7 @@
           <a:p>
             <a:fld id="{6BAB3201-8CBA-4DCE-BDB9-4692BAE81E1A}" type="datetimeFigureOut">
               <a:rPr lang="en-US" smtClean="0"/>
-              <a:t>3/2/2023</a:t>
+              <a:t>3/3/2023</a:t>
             </a:fld>
             <a:endParaRPr lang="en-US"/>
           </a:p>
@@ -6135,7 +6247,7 @@
           <a:p>
             <a:fld id="{6BAB3201-8CBA-4DCE-BDB9-4692BAE81E1A}" type="datetimeFigureOut">
               <a:rPr lang="en-US" smtClean="0"/>
-              <a:t>3/2/2023</a:t>
+              <a:t>3/3/2023</a:t>
             </a:fld>
             <a:endParaRPr lang="en-US"/>
           </a:p>
@@ -6400,7 +6512,7 @@
           <a:p>
             <a:fld id="{6BAB3201-8CBA-4DCE-BDB9-4692BAE81E1A}" type="datetimeFigureOut">
               <a:rPr lang="en-US" smtClean="0"/>
-              <a:t>3/2/2023</a:t>
+              <a:t>3/3/2023</a:t>
             </a:fld>
             <a:endParaRPr lang="en-US"/>
           </a:p>
@@ -6812,7 +6924,7 @@
           <a:p>
             <a:fld id="{6BAB3201-8CBA-4DCE-BDB9-4692BAE81E1A}" type="datetimeFigureOut">
               <a:rPr lang="en-US" smtClean="0"/>
-              <a:t>3/2/2023</a:t>
+              <a:t>3/3/2023</a:t>
             </a:fld>
             <a:endParaRPr lang="en-US"/>
           </a:p>
@@ -6953,7 +7065,7 @@
           <a:p>
             <a:fld id="{6BAB3201-8CBA-4DCE-BDB9-4692BAE81E1A}" type="datetimeFigureOut">
               <a:rPr lang="en-US" smtClean="0"/>
-              <a:t>3/2/2023</a:t>
+              <a:t>3/3/2023</a:t>
             </a:fld>
             <a:endParaRPr lang="en-US"/>
           </a:p>
@@ -7066,7 +7178,7 @@
           <a:p>
             <a:fld id="{6BAB3201-8CBA-4DCE-BDB9-4692BAE81E1A}" type="datetimeFigureOut">
               <a:rPr lang="en-US" smtClean="0"/>
-              <a:t>3/2/2023</a:t>
+              <a:t>3/3/2023</a:t>
             </a:fld>
             <a:endParaRPr lang="en-US"/>
           </a:p>
@@ -7377,7 +7489,7 @@
           <a:p>
             <a:fld id="{6BAB3201-8CBA-4DCE-BDB9-4692BAE81E1A}" type="datetimeFigureOut">
               <a:rPr lang="en-US" smtClean="0"/>
-              <a:t>3/2/2023</a:t>
+              <a:t>3/3/2023</a:t>
             </a:fld>
             <a:endParaRPr lang="en-US"/>
           </a:p>
@@ -7665,7 +7777,7 @@
           <a:p>
             <a:fld id="{6BAB3201-8CBA-4DCE-BDB9-4692BAE81E1A}" type="datetimeFigureOut">
               <a:rPr lang="en-US" smtClean="0"/>
-              <a:t>3/2/2023</a:t>
+              <a:t>3/3/2023</a:t>
             </a:fld>
             <a:endParaRPr lang="en-US"/>
           </a:p>
@@ -7906,7 +8018,7 @@
           <a:p>
             <a:fld id="{6BAB3201-8CBA-4DCE-BDB9-4692BAE81E1A}" type="datetimeFigureOut">
               <a:rPr lang="en-US" smtClean="0"/>
-              <a:t>3/2/2023</a:t>
+              <a:t>3/3/2023</a:t>
             </a:fld>
             <a:endParaRPr lang="en-US"/>
           </a:p>
@@ -10219,6 +10331,346 @@
           <p:cNvPr id="2" name="Title 1">
             <a:extLst>
               <a:ext uri="{FF2B5EF4-FFF2-40B4-BE49-F238E27FC236}">
+                <a16:creationId xmlns:a16="http://schemas.microsoft.com/office/drawing/2014/main" id="{49BA2386-366F-6FCE-68F8-EA9726EBBEDD}"/>
+              </a:ext>
+            </a:extLst>
+          </p:cNvPr>
+          <p:cNvSpPr>
+            <a:spLocks noGrp="1"/>
+          </p:cNvSpPr>
+          <p:nvPr>
+            <p:ph type="title"/>
+          </p:nvPr>
+        </p:nvSpPr>
+        <p:spPr/>
+        <p:txBody>
+          <a:bodyPr/>
+          <a:lstStyle/>
+          <a:p>
+            <a:r>
+              <a:rPr lang="en-US" dirty="0"/>
+              <a:t>Flow Chart</a:t>
+            </a:r>
+          </a:p>
+        </p:txBody>
+      </p:sp>
+      <p:pic>
+        <p:nvPicPr>
+          <p:cNvPr id="4" name="Picture 3">
+            <a:extLst>
+              <a:ext uri="{FF2B5EF4-FFF2-40B4-BE49-F238E27FC236}">
+                <a16:creationId xmlns:a16="http://schemas.microsoft.com/office/drawing/2014/main" id="{63FE603D-AD44-1D4F-F406-A5FB7B8CE50E}"/>
+              </a:ext>
+            </a:extLst>
+          </p:cNvPr>
+          <p:cNvPicPr>
+            <a:picLocks noChangeAspect="1"/>
+          </p:cNvPicPr>
+          <p:nvPr/>
+        </p:nvPicPr>
+        <p:blipFill>
+          <a:blip r:embed="rId2"/>
+          <a:stretch>
+            <a:fillRect/>
+          </a:stretch>
+        </p:blipFill>
+        <p:spPr>
+          <a:xfrm>
+            <a:off x="3529781" y="932280"/>
+            <a:ext cx="4650660" cy="5212309"/>
+          </a:xfrm>
+          <a:prstGeom prst="rect">
+            <a:avLst/>
+          </a:prstGeom>
+        </p:spPr>
+      </p:pic>
+    </p:spTree>
+    <p:extLst>
+      <p:ext uri="{BB962C8B-B14F-4D97-AF65-F5344CB8AC3E}">
+        <p14:creationId xmlns:p14="http://schemas.microsoft.com/office/powerpoint/2010/main" val="2525848926"/>
+      </p:ext>
+    </p:extLst>
+  </p:cSld>
+  <p:clrMapOvr>
+    <a:masterClrMapping/>
+  </p:clrMapOvr>
+</p:sld>
+</file>
+
+<file path=ppt/slides/slide11.xml><?xml version="1.0" encoding="utf-8"?>
+<p:sld xmlns:a="http://schemas.openxmlformats.org/drawingml/2006/main" xmlns:r="http://schemas.openxmlformats.org/officeDocument/2006/relationships" xmlns:p="http://schemas.openxmlformats.org/presentationml/2006/main">
+  <p:cSld>
+    <p:spTree>
+      <p:nvGrpSpPr>
+        <p:cNvPr id="1" name=""/>
+        <p:cNvGrpSpPr/>
+        <p:nvPr/>
+      </p:nvGrpSpPr>
+      <p:grpSpPr>
+        <a:xfrm>
+          <a:off x="0" y="0"/>
+          <a:ext cx="0" cy="0"/>
+          <a:chOff x="0" y="0"/>
+          <a:chExt cx="0" cy="0"/>
+        </a:xfrm>
+      </p:grpSpPr>
+      <p:sp>
+        <p:nvSpPr>
+          <p:cNvPr id="2" name="Title 1">
+            <a:extLst>
+              <a:ext uri="{FF2B5EF4-FFF2-40B4-BE49-F238E27FC236}">
+                <a16:creationId xmlns:a16="http://schemas.microsoft.com/office/drawing/2014/main" id="{7CA4AFFB-3857-8BB7-A885-460B1A7A5CFD}"/>
+              </a:ext>
+            </a:extLst>
+          </p:cNvPr>
+          <p:cNvSpPr>
+            <a:spLocks noGrp="1"/>
+          </p:cNvSpPr>
+          <p:nvPr>
+            <p:ph type="title"/>
+          </p:nvPr>
+        </p:nvSpPr>
+        <p:spPr/>
+        <p:txBody>
+          <a:bodyPr/>
+          <a:lstStyle/>
+          <a:p>
+            <a:r>
+              <a:rPr lang="en-US" dirty="0"/>
+              <a:t>Machine Learning Algorithms 	</a:t>
+            </a:r>
+          </a:p>
+        </p:txBody>
+      </p:sp>
+      <p:sp>
+        <p:nvSpPr>
+          <p:cNvPr id="3" name="Text Placeholder 2">
+            <a:extLst>
+              <a:ext uri="{FF2B5EF4-FFF2-40B4-BE49-F238E27FC236}">
+                <a16:creationId xmlns:a16="http://schemas.microsoft.com/office/drawing/2014/main" id="{1A7F1A04-F16A-CD20-FC4F-B7B7BBB7720D}"/>
+              </a:ext>
+            </a:extLst>
+          </p:cNvPr>
+          <p:cNvSpPr>
+            <a:spLocks noGrp="1"/>
+          </p:cNvSpPr>
+          <p:nvPr>
+            <p:ph type="body" idx="1"/>
+          </p:nvPr>
+        </p:nvSpPr>
+        <p:spPr/>
+        <p:txBody>
+          <a:bodyPr/>
+          <a:lstStyle/>
+          <a:p>
+            <a:pPr marL="76200" indent="0">
+              <a:buNone/>
+            </a:pPr>
+            <a:r>
+              <a:rPr lang="en-US" dirty="0"/>
+              <a:t>Linear Regression:</a:t>
+            </a:r>
+          </a:p>
+          <a:p>
+            <a:pPr marL="76200" indent="0">
+              <a:buNone/>
+            </a:pPr>
+            <a:r>
+              <a:rPr lang="en-US" sz="2000" b="0" dirty="0">
+                <a:solidFill>
+                  <a:srgbClr val="222222"/>
+                </a:solidFill>
+                <a:latin typeface="Arial" panose="020B0604020202020204" pitchFamily="34" charset="0"/>
+              </a:rPr>
+              <a:t>The link between two or more variables can be modeled using this straightforward but efficient algorithm. It might be applied to forecast how Covid-19 cases and associated policy actions will affect GDP and unemployment rates.</a:t>
+            </a:r>
+          </a:p>
+          <a:p>
+            <a:pPr marL="76200" indent="0">
+              <a:buNone/>
+            </a:pPr>
+            <a:r>
+              <a:rPr lang="en-US" dirty="0"/>
+              <a:t>Random Forest:</a:t>
+            </a:r>
+          </a:p>
+          <a:p>
+            <a:pPr marL="76200" indent="0">
+              <a:buNone/>
+            </a:pPr>
+            <a:r>
+              <a:rPr lang="en-US" sz="2000" b="0" dirty="0">
+                <a:solidFill>
+                  <a:srgbClr val="222222"/>
+                </a:solidFill>
+                <a:latin typeface="Arial" panose="020B0604020202020204" pitchFamily="34" charset="0"/>
+              </a:rPr>
+              <a:t>An ensemble technique mixes different decision trees to increase the precision of predictions. By considering a number of variables associated to Covid-19 instances and relevant policy actions, it could be utilized to produce projections of GDP and unemployment rates that are more accurate.</a:t>
+            </a:r>
+          </a:p>
+        </p:txBody>
+      </p:sp>
+    </p:spTree>
+    <p:extLst>
+      <p:ext uri="{BB962C8B-B14F-4D97-AF65-F5344CB8AC3E}">
+        <p14:creationId xmlns:p14="http://schemas.microsoft.com/office/powerpoint/2010/main" val="223923989"/>
+      </p:ext>
+    </p:extLst>
+  </p:cSld>
+  <p:clrMapOvr>
+    <a:masterClrMapping/>
+  </p:clrMapOvr>
+</p:sld>
+</file>
+
+<file path=ppt/slides/slide12.xml><?xml version="1.0" encoding="utf-8"?>
+<p:sld xmlns:a="http://schemas.openxmlformats.org/drawingml/2006/main" xmlns:r="http://schemas.openxmlformats.org/officeDocument/2006/relationships" xmlns:p="http://schemas.openxmlformats.org/presentationml/2006/main">
+  <p:cSld>
+    <p:spTree>
+      <p:nvGrpSpPr>
+        <p:cNvPr id="1" name=""/>
+        <p:cNvGrpSpPr/>
+        <p:nvPr/>
+      </p:nvGrpSpPr>
+      <p:grpSpPr>
+        <a:xfrm>
+          <a:off x="0" y="0"/>
+          <a:ext cx="0" cy="0"/>
+          <a:chOff x="0" y="0"/>
+          <a:chExt cx="0" cy="0"/>
+        </a:xfrm>
+      </p:grpSpPr>
+      <p:sp>
+        <p:nvSpPr>
+          <p:cNvPr id="3" name="Text Placeholder 2">
+            <a:extLst>
+              <a:ext uri="{FF2B5EF4-FFF2-40B4-BE49-F238E27FC236}">
+                <a16:creationId xmlns:a16="http://schemas.microsoft.com/office/drawing/2014/main" id="{58A75B71-7FA9-6BC4-3AAD-87BBCF4D8FF4}"/>
+              </a:ext>
+            </a:extLst>
+          </p:cNvPr>
+          <p:cNvSpPr>
+            <a:spLocks noGrp="1"/>
+          </p:cNvSpPr>
+          <p:nvPr>
+            <p:ph type="body" idx="1"/>
+          </p:nvPr>
+        </p:nvSpPr>
+        <p:spPr>
+          <a:xfrm>
+            <a:off x="838200" y="648929"/>
+            <a:ext cx="10515600" cy="5528034"/>
+          </a:xfrm>
+        </p:spPr>
+        <p:txBody>
+          <a:bodyPr/>
+          <a:lstStyle/>
+          <a:p>
+            <a:pPr marL="76200" indent="0">
+              <a:buNone/>
+            </a:pPr>
+            <a:r>
+              <a:rPr lang="en-US" dirty="0"/>
+              <a:t>XGBoost :</a:t>
+            </a:r>
+          </a:p>
+          <a:p>
+            <a:pPr marL="76200" indent="0">
+              <a:buNone/>
+            </a:pPr>
+            <a:r>
+              <a:rPr lang="en-US" sz="2000" b="0" dirty="0">
+                <a:solidFill>
+                  <a:srgbClr val="222222"/>
+                </a:solidFill>
+                <a:latin typeface="Arial" panose="020B0604020202020204" pitchFamily="34" charset="0"/>
+              </a:rPr>
+              <a:t>A class of group machine learning methods known as gradient boosting can be applied to classification or regression predictive modeling issues. Decision tree models are used to build clusters. In order to repair the prediction mistakes caused by earlier models, trees are added one at a time to the ensemble and fitted. Boosting is a term used to describe this kind of batch machine learning model.</a:t>
+            </a:r>
+          </a:p>
+          <a:p>
+            <a:pPr marL="76200" indent="0">
+              <a:buNone/>
+            </a:pPr>
+            <a:r>
+              <a:rPr lang="en-US" dirty="0"/>
+              <a:t>Decision Tree : </a:t>
+            </a:r>
+          </a:p>
+          <a:p>
+            <a:pPr marL="76200" indent="0">
+              <a:buNone/>
+            </a:pPr>
+            <a:r>
+              <a:rPr lang="en-US" sz="2000" b="0" dirty="0">
+                <a:solidFill>
+                  <a:srgbClr val="222222"/>
+                </a:solidFill>
+                <a:latin typeface="Arial" panose="020B0604020202020204" pitchFamily="34" charset="0"/>
+              </a:rPr>
+              <a:t>A decision tree creates tree-like models for classification or regression. It incrementally develops an associated decision tree while segmenting a dataset into smaller and smaller sections. The outcome is a tree containing leaf nodes and decision nodes.</a:t>
+            </a:r>
+          </a:p>
+          <a:p>
+            <a:pPr marL="76200" indent="0">
+              <a:buNone/>
+            </a:pPr>
+            <a:r>
+              <a:rPr lang="en-US" dirty="0"/>
+              <a:t>Support Vector Machines (SVM) : </a:t>
+            </a:r>
+          </a:p>
+          <a:p>
+            <a:pPr marL="76200" indent="0">
+              <a:buNone/>
+            </a:pPr>
+            <a:r>
+              <a:rPr lang="en-US" sz="2000" b="0" dirty="0">
+                <a:solidFill>
+                  <a:srgbClr val="222222"/>
+                </a:solidFill>
+                <a:latin typeface="Arial" panose="020B0604020202020204" pitchFamily="34" charset="0"/>
+              </a:rPr>
+              <a:t>By identifying the ideal decision border between data points, this approach can be applied to both classification and regression issues. It might be used to find the model that fits the data the best and forecasts how Covid-19 would affect GDP and unemployment rates</a:t>
+            </a:r>
+          </a:p>
+        </p:txBody>
+      </p:sp>
+    </p:spTree>
+    <p:extLst>
+      <p:ext uri="{BB962C8B-B14F-4D97-AF65-F5344CB8AC3E}">
+        <p14:creationId xmlns:p14="http://schemas.microsoft.com/office/powerpoint/2010/main" val="3191939578"/>
+      </p:ext>
+    </p:extLst>
+  </p:cSld>
+  <p:clrMapOvr>
+    <a:masterClrMapping/>
+  </p:clrMapOvr>
+</p:sld>
+</file>
+
+<file path=ppt/slides/slide13.xml><?xml version="1.0" encoding="utf-8"?>
+<p:sld xmlns:a="http://schemas.openxmlformats.org/drawingml/2006/main" xmlns:r="http://schemas.openxmlformats.org/officeDocument/2006/relationships" xmlns:p="http://schemas.openxmlformats.org/presentationml/2006/main">
+  <p:cSld>
+    <p:spTree>
+      <p:nvGrpSpPr>
+        <p:cNvPr id="1" name=""/>
+        <p:cNvGrpSpPr/>
+        <p:nvPr/>
+      </p:nvGrpSpPr>
+      <p:grpSpPr>
+        <a:xfrm>
+          <a:off x="0" y="0"/>
+          <a:ext cx="0" cy="0"/>
+          <a:chOff x="0" y="0"/>
+          <a:chExt cx="0" cy="0"/>
+        </a:xfrm>
+      </p:grpSpPr>
+      <p:sp>
+        <p:nvSpPr>
+          <p:cNvPr id="2" name="Title 1">
+            <a:extLst>
+              <a:ext uri="{FF2B5EF4-FFF2-40B4-BE49-F238E27FC236}">
                 <a16:creationId xmlns:a16="http://schemas.microsoft.com/office/drawing/2014/main" id="{39480249-A00C-E457-848F-D47D59D1C16A}"/>
               </a:ext>
             </a:extLst>
@@ -10291,7 +10743,7 @@
 </p:sld>
 </file>
 
-<file path=ppt/slides/slide11.xml><?xml version="1.0" encoding="utf-8"?>
+<file path=ppt/slides/slide14.xml><?xml version="1.0" encoding="utf-8"?>
 <p:sld xmlns:a="http://schemas.openxmlformats.org/drawingml/2006/main" xmlns:r="http://schemas.openxmlformats.org/officeDocument/2006/relationships" xmlns:p="http://schemas.openxmlformats.org/presentationml/2006/main">
   <p:cSld>
     <p:spTree>
@@ -12238,7 +12690,7 @@
   <p:cSld>
     <p:spTree>
       <p:nvGrpSpPr>
-        <p:cNvPr id="1" name=""/>
+        <p:cNvPr id="1" name="Shape 350"/>
         <p:cNvGrpSpPr/>
         <p:nvPr/>
       </p:nvGrpSpPr>
@@ -12252,127 +12704,72 @@
       </p:grpSpPr>
       <p:sp>
         <p:nvSpPr>
-          <p:cNvPr id="2" name="Title 1">
-            <a:extLst>
-              <a:ext uri="{FF2B5EF4-FFF2-40B4-BE49-F238E27FC236}">
-                <a16:creationId xmlns:a16="http://schemas.microsoft.com/office/drawing/2014/main" id="{A75A5506-3DE9-8BBF-56F2-740E4E8087E1}"/>
-              </a:ext>
-            </a:extLst>
-          </p:cNvPr>
-          <p:cNvSpPr>
+          <p:cNvPr id="351" name="Google Shape;351;p48"/>
+          <p:cNvSpPr txBox="1">
             <a:spLocks noGrp="1"/>
           </p:cNvSpPr>
           <p:nvPr>
-            <p:ph type="title"/>
+            <p:ph type="ctrTitle"/>
           </p:nvPr>
         </p:nvSpPr>
-        <p:spPr/>
-        <p:txBody>
-          <a:bodyPr/>
+        <p:spPr>
+          <a:xfrm>
+            <a:off x="1562200" y="2374525"/>
+            <a:ext cx="8454900" cy="1187700"/>
+          </a:xfrm>
+          <a:prstGeom prst="rect">
+            <a:avLst/>
+          </a:prstGeom>
+          <a:noFill/>
+          <a:ln>
+            <a:noFill/>
+          </a:ln>
+        </p:spPr>
+        <p:txBody>
+          <a:bodyPr spcFirstLastPara="1" wrap="square" lIns="91425" tIns="45700" rIns="91425" bIns="45700" anchor="b" anchorCtr="0">
+            <a:noAutofit/>
+          </a:bodyPr>
           <a:lstStyle/>
           <a:p>
-            <a:r>
-              <a:rPr lang="en-US" dirty="0"/>
+            <a:pPr marL="0" lvl="0" indent="0" algn="ctr" rtl="0">
+              <a:lnSpc>
+                <a:spcPct val="90000"/>
+              </a:lnSpc>
+              <a:spcBef>
+                <a:spcPts val="0"/>
+              </a:spcBef>
+              <a:spcAft>
+                <a:spcPts val="0"/>
+              </a:spcAft>
+              <a:buClr>
+                <a:schemeClr val="lt1"/>
+              </a:buClr>
+              <a:buSzPts val="4400"/>
+              <a:buFont typeface="Arial"/>
+              <a:buNone/>
+            </a:pPr>
+            <a:r>
+              <a:rPr lang="en-US" sz="6500" b="0" dirty="0">
+                <a:latin typeface="EB Garamond ExtraBold"/>
+                <a:ea typeface="EB Garamond ExtraBold"/>
+                <a:cs typeface="EB Garamond ExtraBold"/>
+                <a:sym typeface="EB Garamond ExtraBold"/>
+              </a:rPr>
               <a:t>Project Background</a:t>
             </a:r>
-          </a:p>
-        </p:txBody>
-      </p:sp>
-      <p:sp>
-        <p:nvSpPr>
-          <p:cNvPr id="3" name="Text Placeholder 2">
-            <a:extLst>
-              <a:ext uri="{FF2B5EF4-FFF2-40B4-BE49-F238E27FC236}">
-                <a16:creationId xmlns:a16="http://schemas.microsoft.com/office/drawing/2014/main" id="{13920A81-4368-57DE-88AD-7DD306AFD69F}"/>
-              </a:ext>
-            </a:extLst>
-          </p:cNvPr>
-          <p:cNvSpPr>
-            <a:spLocks noGrp="1"/>
-          </p:cNvSpPr>
-          <p:nvPr>
-            <p:ph type="body" idx="1"/>
-          </p:nvPr>
-        </p:nvSpPr>
-        <p:spPr/>
-        <p:txBody>
-          <a:bodyPr/>
-          <a:lstStyle/>
-          <a:p>
-            <a:r>
-              <a:rPr lang="en-US" dirty="0"/>
-              <a:t>Tools</a:t>
-            </a:r>
-          </a:p>
-          <a:p>
-            <a:pPr lvl="1"/>
-            <a:r>
-              <a:rPr lang="en-US" dirty="0"/>
-              <a:t>Python</a:t>
-            </a:r>
-          </a:p>
-          <a:p>
-            <a:pPr lvl="1"/>
-            <a:r>
-              <a:rPr lang="en-US" dirty="0" err="1"/>
-              <a:t>Jupyter</a:t>
-            </a:r>
-            <a:r>
-              <a:rPr lang="en-US" dirty="0"/>
-              <a:t> Notebook</a:t>
-            </a:r>
-          </a:p>
-          <a:p>
-            <a:pPr lvl="1"/>
-            <a:r>
-              <a:rPr lang="en-US" dirty="0"/>
-              <a:t>Seaborn</a:t>
-            </a:r>
-          </a:p>
-          <a:p>
-            <a:pPr lvl="1"/>
-            <a:r>
-              <a:rPr lang="en-US" dirty="0" err="1"/>
-              <a:t>Numpy</a:t>
-            </a:r>
-            <a:endParaRPr lang="en-US" dirty="0"/>
-          </a:p>
-          <a:p>
-            <a:pPr lvl="1"/>
-            <a:r>
-              <a:rPr lang="en-US" dirty="0"/>
-              <a:t>Matplotlib</a:t>
-            </a:r>
-          </a:p>
-          <a:p>
-            <a:pPr lvl="1"/>
-            <a:r>
-              <a:rPr lang="en-US" dirty="0"/>
-              <a:t>Aws </a:t>
-            </a:r>
-            <a:r>
-              <a:rPr lang="en-US" dirty="0" err="1"/>
-              <a:t>SageMaker</a:t>
-            </a:r>
-            <a:endParaRPr lang="en-US" dirty="0"/>
-          </a:p>
-          <a:p>
-            <a:pPr lvl="1"/>
-            <a:r>
-              <a:rPr lang="en-US" dirty="0"/>
-              <a:t>Excel</a:t>
-            </a:r>
-          </a:p>
-          <a:p>
-            <a:pPr lvl="1"/>
-            <a:endParaRPr lang="en-US" dirty="0"/>
+            <a:endParaRPr sz="6500" b="0" dirty="0">
+              <a:latin typeface="EB Garamond ExtraBold"/>
+              <a:ea typeface="EB Garamond ExtraBold"/>
+              <a:cs typeface="EB Garamond ExtraBold"/>
+              <a:sym typeface="EB Garamond ExtraBold"/>
+            </a:endParaRPr>
           </a:p>
         </p:txBody>
       </p:sp>
     </p:spTree>
     <p:extLst>
       <p:ext uri="{BB962C8B-B14F-4D97-AF65-F5344CB8AC3E}">
-        <p14:creationId xmlns:p14="http://schemas.microsoft.com/office/powerpoint/2010/main" val="882994751"/>
+        <p14:creationId xmlns:p14="http://schemas.microsoft.com/office/powerpoint/2010/main" val="1916592904"/>
       </p:ext>
     </p:extLst>
   </p:cSld>
@@ -12404,7 +12801,7 @@
           <p:cNvPr id="2" name="Title 1">
             <a:extLst>
               <a:ext uri="{FF2B5EF4-FFF2-40B4-BE49-F238E27FC236}">
-                <a16:creationId xmlns:a16="http://schemas.microsoft.com/office/drawing/2014/main" id="{49BA2386-366F-6FCE-68F8-EA9726EBBEDD}"/>
+                <a16:creationId xmlns:a16="http://schemas.microsoft.com/office/drawing/2014/main" id="{A75A5506-3DE9-8BBF-56F2-740E4E8087E1}"/>
               </a:ext>
             </a:extLst>
           </p:cNvPr>
@@ -12422,45 +12819,100 @@
           <a:p>
             <a:r>
               <a:rPr lang="en-US" dirty="0"/>
-              <a:t>Flow</a:t>
-            </a:r>
-          </a:p>
-        </p:txBody>
-      </p:sp>
-      <p:pic>
-        <p:nvPicPr>
-          <p:cNvPr id="5" name="Picture 4">
+              <a:t>Tools</a:t>
+            </a:r>
+          </a:p>
+        </p:txBody>
+      </p:sp>
+      <p:sp>
+        <p:nvSpPr>
+          <p:cNvPr id="3" name="Text Placeholder 2">
             <a:extLst>
               <a:ext uri="{FF2B5EF4-FFF2-40B4-BE49-F238E27FC236}">
-                <a16:creationId xmlns:a16="http://schemas.microsoft.com/office/drawing/2014/main" id="{5EEF60FD-8C04-B104-1EEE-92A0AB9C7494}"/>
+                <a16:creationId xmlns:a16="http://schemas.microsoft.com/office/drawing/2014/main" id="{13920A81-4368-57DE-88AD-7DD306AFD69F}"/>
               </a:ext>
             </a:extLst>
           </p:cNvPr>
-          <p:cNvPicPr>
-            <a:picLocks noChangeAspect="1"/>
-          </p:cNvPicPr>
-          <p:nvPr/>
-        </p:nvPicPr>
-        <p:blipFill>
-          <a:blip r:embed="rId2"/>
-          <a:stretch>
-            <a:fillRect/>
-          </a:stretch>
-        </p:blipFill>
-        <p:spPr>
-          <a:xfrm>
-            <a:off x="3592613" y="963716"/>
-            <a:ext cx="5006774" cy="4930567"/>
-          </a:xfrm>
-          <a:prstGeom prst="rect">
-            <a:avLst/>
-          </a:prstGeom>
-        </p:spPr>
-      </p:pic>
+          <p:cNvSpPr>
+            <a:spLocks noGrp="1"/>
+          </p:cNvSpPr>
+          <p:nvPr>
+            <p:ph type="body" idx="1"/>
+          </p:nvPr>
+        </p:nvSpPr>
+        <p:spPr/>
+        <p:txBody>
+          <a:bodyPr/>
+          <a:lstStyle/>
+          <a:p>
+            <a:pPr lvl="1"/>
+            <a:r>
+              <a:rPr lang="en-US" dirty="0"/>
+              <a:t>Python</a:t>
+            </a:r>
+          </a:p>
+          <a:p>
+            <a:pPr lvl="1"/>
+            <a:r>
+              <a:rPr lang="en-US" dirty="0" err="1"/>
+              <a:t>Jupyter</a:t>
+            </a:r>
+            <a:r>
+              <a:rPr lang="en-US" dirty="0"/>
+              <a:t> Notebook</a:t>
+            </a:r>
+          </a:p>
+          <a:p>
+            <a:pPr lvl="1"/>
+            <a:r>
+              <a:rPr lang="en-US" dirty="0"/>
+              <a:t>Seaborn</a:t>
+            </a:r>
+          </a:p>
+          <a:p>
+            <a:pPr lvl="1"/>
+            <a:r>
+              <a:rPr lang="en-US" dirty="0" err="1"/>
+              <a:t>Numpy</a:t>
+            </a:r>
+            <a:endParaRPr lang="en-US" dirty="0"/>
+          </a:p>
+          <a:p>
+            <a:pPr lvl="1"/>
+            <a:r>
+              <a:rPr lang="en-US" dirty="0"/>
+              <a:t>Matplotlib</a:t>
+            </a:r>
+          </a:p>
+          <a:p>
+            <a:pPr lvl="1"/>
+            <a:r>
+              <a:rPr lang="en-US" dirty="0"/>
+              <a:t>Aws </a:t>
+            </a:r>
+            <a:r>
+              <a:rPr lang="en-US" dirty="0" err="1"/>
+              <a:t>SageMaker</a:t>
+            </a:r>
+            <a:endParaRPr lang="en-US" dirty="0"/>
+          </a:p>
+          <a:p>
+            <a:pPr lvl="1"/>
+            <a:r>
+              <a:rPr lang="en-US" dirty="0"/>
+              <a:t>Excel</a:t>
+            </a:r>
+          </a:p>
+          <a:p>
+            <a:pPr lvl="1"/>
+            <a:endParaRPr lang="en-US" dirty="0"/>
+          </a:p>
+        </p:txBody>
+      </p:sp>
     </p:spTree>
     <p:extLst>
       <p:ext uri="{BB962C8B-B14F-4D97-AF65-F5344CB8AC3E}">
-        <p14:creationId xmlns:p14="http://schemas.microsoft.com/office/powerpoint/2010/main" val="2525848926"/>
+        <p14:creationId xmlns:p14="http://schemas.microsoft.com/office/powerpoint/2010/main" val="882994751"/>
       </p:ext>
     </p:extLst>
   </p:cSld>

</xml_diff>

<commit_message>
added a new slide at the end for removing china data in XGBoost
</commit_message>
<xml_diff>
--- a/presentataions/Presentation.pptx
+++ b/presentataions/Presentation.pptx
@@ -6,7 +6,7 @@
     <p:sldMasterId id="2147483661" r:id="rId2"/>
   </p:sldMasterIdLst>
   <p:notesMasterIdLst>
-    <p:notesMasterId r:id="rId34"/>
+    <p:notesMasterId r:id="rId35"/>
   </p:notesMasterIdLst>
   <p:sldIdLst>
     <p:sldId id="257" r:id="rId3"/>
@@ -39,7 +39,8 @@
     <p:sldId id="323" r:id="rId30"/>
     <p:sldId id="324" r:id="rId31"/>
     <p:sldId id="325" r:id="rId32"/>
-    <p:sldId id="287" r:id="rId33"/>
+    <p:sldId id="326" r:id="rId33"/>
+    <p:sldId id="287" r:id="rId34"/>
   </p:sldIdLst>
   <p:sldSz cx="12192000" cy="6858000"/>
   <p:notesSz cx="6858000" cy="9144000"/>
@@ -228,7 +229,7 @@
           <a:p>
             <a:fld id="{AD276A9C-E8FB-4187-B9E8-54A34F7E3A46}" type="datetimeFigureOut">
               <a:rPr lang="en-US" smtClean="0"/>
-              <a:t>4/24/2023</a:t>
+              <a:t>5/2/2023</a:t>
             </a:fld>
             <a:endParaRPr lang="en-US"/>
           </a:p>
@@ -2129,6 +2130,157 @@
   <p:cSld>
     <p:spTree>
       <p:nvGrpSpPr>
+        <p:cNvPr id="1" name="Shape 300"/>
+        <p:cNvGrpSpPr/>
+        <p:nvPr/>
+      </p:nvGrpSpPr>
+      <p:grpSpPr>
+        <a:xfrm>
+          <a:off x="0" y="0"/>
+          <a:ext cx="0" cy="0"/>
+          <a:chOff x="0" y="0"/>
+          <a:chExt cx="0" cy="0"/>
+        </a:xfrm>
+      </p:grpSpPr>
+      <p:sp>
+        <p:nvSpPr>
+          <p:cNvPr id="301" name="Google Shape;301;g1ad9dd80d09_0_1016:notes"/>
+          <p:cNvSpPr>
+            <a:spLocks noGrp="1" noRot="1" noChangeAspect="1"/>
+          </p:cNvSpPr>
+          <p:nvPr>
+            <p:ph type="sldImg" idx="2"/>
+          </p:nvPr>
+        </p:nvSpPr>
+        <p:spPr>
+          <a:xfrm>
+            <a:off x="685800" y="1143000"/>
+            <a:ext cx="5486400" cy="3086100"/>
+          </a:xfrm>
+          <a:custGeom>
+            <a:avLst/>
+            <a:gdLst/>
+            <a:ahLst/>
+            <a:cxnLst/>
+            <a:rect l="l" t="t" r="r" b="b"/>
+            <a:pathLst>
+              <a:path w="120000" h="120000" extrusionOk="0">
+                <a:moveTo>
+                  <a:pt x="0" y="0"/>
+                </a:moveTo>
+                <a:lnTo>
+                  <a:pt x="120000" y="0"/>
+                </a:lnTo>
+                <a:lnTo>
+                  <a:pt x="120000" y="120000"/>
+                </a:lnTo>
+                <a:lnTo>
+                  <a:pt x="0" y="120000"/>
+                </a:lnTo>
+                <a:close/>
+              </a:path>
+            </a:pathLst>
+          </a:custGeom>
+        </p:spPr>
+      </p:sp>
+      <p:sp>
+        <p:nvSpPr>
+          <p:cNvPr id="302" name="Google Shape;302;g1ad9dd80d09_0_1016:notes"/>
+          <p:cNvSpPr txBox="1">
+            <a:spLocks noGrp="1"/>
+          </p:cNvSpPr>
+          <p:nvPr>
+            <p:ph type="body" idx="1"/>
+          </p:nvPr>
+        </p:nvSpPr>
+        <p:spPr>
+          <a:xfrm>
+            <a:off x="685800" y="4400550"/>
+            <a:ext cx="5486400" cy="3600600"/>
+          </a:xfrm>
+          <a:prstGeom prst="rect">
+            <a:avLst/>
+          </a:prstGeom>
+        </p:spPr>
+        <p:txBody>
+          <a:bodyPr spcFirstLastPara="1" wrap="square" lIns="91425" tIns="45700" rIns="91425" bIns="45700" anchor="t" anchorCtr="0">
+            <a:noAutofit/>
+          </a:bodyPr>
+          <a:lstStyle/>
+          <a:p>
+            <a:pPr marL="0" lvl="0" indent="0" algn="l" rtl="0">
+              <a:spcBef>
+                <a:spcPts val="0"/>
+              </a:spcBef>
+              <a:spcAft>
+                <a:spcPts val="0"/>
+              </a:spcAft>
+              <a:buNone/>
+            </a:pPr>
+            <a:endParaRPr/>
+          </a:p>
+        </p:txBody>
+      </p:sp>
+      <p:sp>
+        <p:nvSpPr>
+          <p:cNvPr id="303" name="Google Shape;303;g1ad9dd80d09_0_1016:notes"/>
+          <p:cNvSpPr txBox="1">
+            <a:spLocks noGrp="1"/>
+          </p:cNvSpPr>
+          <p:nvPr>
+            <p:ph type="sldNum" idx="12"/>
+          </p:nvPr>
+        </p:nvSpPr>
+        <p:spPr>
+          <a:xfrm>
+            <a:off x="3884613" y="8685213"/>
+            <a:ext cx="2971800" cy="458700"/>
+          </a:xfrm>
+          <a:prstGeom prst="rect">
+            <a:avLst/>
+          </a:prstGeom>
+        </p:spPr>
+        <p:txBody>
+          <a:bodyPr spcFirstLastPara="1" wrap="square" lIns="91425" tIns="45700" rIns="91425" bIns="45700" anchor="b" anchorCtr="0">
+            <a:noAutofit/>
+          </a:bodyPr>
+          <a:lstStyle/>
+          <a:p>
+            <a:pPr marL="0" lvl="0" indent="0" algn="r" rtl="0">
+              <a:spcBef>
+                <a:spcPts val="0"/>
+              </a:spcBef>
+              <a:spcAft>
+                <a:spcPts val="0"/>
+              </a:spcAft>
+              <a:buNone/>
+            </a:pPr>
+            <a:fld id="{00000000-1234-1234-1234-123412341234}" type="slidenum">
+              <a:rPr lang="en-US"/>
+              <a:t>31</a:t>
+            </a:fld>
+            <a:endParaRPr/>
+          </a:p>
+        </p:txBody>
+      </p:sp>
+    </p:spTree>
+    <p:extLst>
+      <p:ext uri="{BB962C8B-B14F-4D97-AF65-F5344CB8AC3E}">
+        <p14:creationId xmlns:p14="http://schemas.microsoft.com/office/powerpoint/2010/main" val="1876995830"/>
+      </p:ext>
+    </p:extLst>
+  </p:cSld>
+  <p:clrMapOvr>
+    <a:masterClrMapping/>
+  </p:clrMapOvr>
+</p:notes>
+</file>
+
+<file path=ppt/notesSlides/notesSlide21.xml><?xml version="1.0" encoding="utf-8"?>
+<p:notes xmlns:a="http://schemas.openxmlformats.org/drawingml/2006/main" xmlns:r="http://schemas.openxmlformats.org/officeDocument/2006/relationships" xmlns:p="http://schemas.openxmlformats.org/presentationml/2006/main" showMasterSp="0" showMasterPhAnim="0">
+  <p:cSld>
+    <p:spTree>
+      <p:nvGrpSpPr>
         <p:cNvPr id="1" name="Shape 347"/>
         <p:cNvGrpSpPr/>
         <p:nvPr/>
@@ -3287,7 +3439,7 @@
           <a:p>
             <a:fld id="{6BAB3201-8CBA-4DCE-BDB9-4692BAE81E1A}" type="datetimeFigureOut">
               <a:rPr lang="en-US" smtClean="0"/>
-              <a:t>4/24/2023</a:t>
+              <a:t>5/2/2023</a:t>
             </a:fld>
             <a:endParaRPr lang="en-US"/>
           </a:p>
@@ -3485,7 +3637,7 @@
           <a:p>
             <a:fld id="{6BAB3201-8CBA-4DCE-BDB9-4692BAE81E1A}" type="datetimeFigureOut">
               <a:rPr lang="en-US" smtClean="0"/>
-              <a:t>4/24/2023</a:t>
+              <a:t>5/2/2023</a:t>
             </a:fld>
             <a:endParaRPr lang="en-US"/>
           </a:p>
@@ -3693,7 +3845,7 @@
           <a:p>
             <a:fld id="{6BAB3201-8CBA-4DCE-BDB9-4692BAE81E1A}" type="datetimeFigureOut">
               <a:rPr lang="en-US" smtClean="0"/>
-              <a:t>4/24/2023</a:t>
+              <a:t>5/2/2023</a:t>
             </a:fld>
             <a:endParaRPr lang="en-US"/>
           </a:p>
@@ -7850,7 +8002,7 @@
           <a:p>
             <a:fld id="{6BAB3201-8CBA-4DCE-BDB9-4692BAE81E1A}" type="datetimeFigureOut">
               <a:rPr lang="en-US" smtClean="0"/>
-              <a:t>4/24/2023</a:t>
+              <a:t>5/2/2023</a:t>
             </a:fld>
             <a:endParaRPr lang="en-US"/>
           </a:p>
@@ -8125,7 +8277,7 @@
           <a:p>
             <a:fld id="{6BAB3201-8CBA-4DCE-BDB9-4692BAE81E1A}" type="datetimeFigureOut">
               <a:rPr lang="en-US" smtClean="0"/>
-              <a:t>4/24/2023</a:t>
+              <a:t>5/2/2023</a:t>
             </a:fld>
             <a:endParaRPr lang="en-US"/>
           </a:p>
@@ -8390,7 +8542,7 @@
           <a:p>
             <a:fld id="{6BAB3201-8CBA-4DCE-BDB9-4692BAE81E1A}" type="datetimeFigureOut">
               <a:rPr lang="en-US" smtClean="0"/>
-              <a:t>4/24/2023</a:t>
+              <a:t>5/2/2023</a:t>
             </a:fld>
             <a:endParaRPr lang="en-US"/>
           </a:p>
@@ -8802,7 +8954,7 @@
           <a:p>
             <a:fld id="{6BAB3201-8CBA-4DCE-BDB9-4692BAE81E1A}" type="datetimeFigureOut">
               <a:rPr lang="en-US" smtClean="0"/>
-              <a:t>4/24/2023</a:t>
+              <a:t>5/2/2023</a:t>
             </a:fld>
             <a:endParaRPr lang="en-US"/>
           </a:p>
@@ -8943,7 +9095,7 @@
           <a:p>
             <a:fld id="{6BAB3201-8CBA-4DCE-BDB9-4692BAE81E1A}" type="datetimeFigureOut">
               <a:rPr lang="en-US" smtClean="0"/>
-              <a:t>4/24/2023</a:t>
+              <a:t>5/2/2023</a:t>
             </a:fld>
             <a:endParaRPr lang="en-US"/>
           </a:p>
@@ -9056,7 +9208,7 @@
           <a:p>
             <a:fld id="{6BAB3201-8CBA-4DCE-BDB9-4692BAE81E1A}" type="datetimeFigureOut">
               <a:rPr lang="en-US" smtClean="0"/>
-              <a:t>4/24/2023</a:t>
+              <a:t>5/2/2023</a:t>
             </a:fld>
             <a:endParaRPr lang="en-US"/>
           </a:p>
@@ -9367,7 +9519,7 @@
           <a:p>
             <a:fld id="{6BAB3201-8CBA-4DCE-BDB9-4692BAE81E1A}" type="datetimeFigureOut">
               <a:rPr lang="en-US" smtClean="0"/>
-              <a:t>4/24/2023</a:t>
+              <a:t>5/2/2023</a:t>
             </a:fld>
             <a:endParaRPr lang="en-US"/>
           </a:p>
@@ -9655,7 +9807,7 @@
           <a:p>
             <a:fld id="{6BAB3201-8CBA-4DCE-BDB9-4692BAE81E1A}" type="datetimeFigureOut">
               <a:rPr lang="en-US" smtClean="0"/>
-              <a:t>4/24/2023</a:t>
+              <a:t>5/2/2023</a:t>
             </a:fld>
             <a:endParaRPr lang="en-US"/>
           </a:p>
@@ -9896,7 +10048,7 @@
           <a:p>
             <a:fld id="{6BAB3201-8CBA-4DCE-BDB9-4692BAE81E1A}" type="datetimeFigureOut">
               <a:rPr lang="en-US" smtClean="0"/>
-              <a:t>4/24/2023</a:t>
+              <a:t>5/2/2023</a:t>
             </a:fld>
             <a:endParaRPr lang="en-US"/>
           </a:p>
@@ -16830,6 +16982,192 @@
 </file>
 
 <file path=ppt/slides/slide31.xml><?xml version="1.0" encoding="utf-8"?>
+<p:sld xmlns:a="http://schemas.openxmlformats.org/drawingml/2006/main" xmlns:r="http://schemas.openxmlformats.org/officeDocument/2006/relationships" xmlns:p="http://schemas.openxmlformats.org/presentationml/2006/main">
+  <p:cSld>
+    <p:spTree>
+      <p:nvGrpSpPr>
+        <p:cNvPr id="1" name="Shape 304"/>
+        <p:cNvGrpSpPr/>
+        <p:nvPr/>
+      </p:nvGrpSpPr>
+      <p:grpSpPr>
+        <a:xfrm>
+          <a:off x="0" y="0"/>
+          <a:ext cx="0" cy="0"/>
+          <a:chOff x="0" y="0"/>
+          <a:chExt cx="0" cy="0"/>
+        </a:xfrm>
+      </p:grpSpPr>
+      <p:sp>
+        <p:nvSpPr>
+          <p:cNvPr id="305" name="Google Shape;305;p43"/>
+          <p:cNvSpPr txBox="1"/>
+          <p:nvPr/>
+        </p:nvSpPr>
+        <p:spPr>
+          <a:xfrm>
+            <a:off x="479575" y="463600"/>
+            <a:ext cx="10183200" cy="400200"/>
+          </a:xfrm>
+          <a:prstGeom prst="rect">
+            <a:avLst/>
+          </a:prstGeom>
+          <a:noFill/>
+          <a:ln>
+            <a:noFill/>
+          </a:ln>
+        </p:spPr>
+        <p:txBody>
+          <a:bodyPr spcFirstLastPara="1" wrap="square" lIns="91425" tIns="91425" rIns="91425" bIns="91425" anchor="t" anchorCtr="0">
+            <a:spAutoFit/>
+          </a:bodyPr>
+          <a:lstStyle/>
+          <a:p>
+            <a:pPr marL="0" lvl="0" indent="0" algn="l" rtl="0">
+              <a:spcBef>
+                <a:spcPts val="0"/>
+              </a:spcBef>
+              <a:spcAft>
+                <a:spcPts val="0"/>
+              </a:spcAft>
+              <a:buNone/>
+            </a:pPr>
+            <a:endParaRPr/>
+          </a:p>
+        </p:txBody>
+      </p:sp>
+      <p:sp>
+        <p:nvSpPr>
+          <p:cNvPr id="306" name="Google Shape;306;p43"/>
+          <p:cNvSpPr txBox="1"/>
+          <p:nvPr/>
+        </p:nvSpPr>
+        <p:spPr>
+          <a:xfrm>
+            <a:off x="926806" y="584825"/>
+            <a:ext cx="8872200" cy="1292631"/>
+          </a:xfrm>
+          <a:prstGeom prst="rect">
+            <a:avLst/>
+          </a:prstGeom>
+          <a:noFill/>
+          <a:ln>
+            <a:noFill/>
+          </a:ln>
+        </p:spPr>
+        <p:txBody>
+          <a:bodyPr spcFirstLastPara="1" wrap="square" lIns="91425" tIns="91425" rIns="91425" bIns="91425" anchor="t" anchorCtr="0">
+            <a:spAutoFit/>
+          </a:bodyPr>
+          <a:lstStyle/>
+          <a:p>
+            <a:r>
+              <a:rPr lang="en-US" sz="2400" b="1" dirty="0" err="1">
+                <a:latin typeface="EB Garamond"/>
+                <a:ea typeface="EB Garamond"/>
+              </a:rPr>
+              <a:t>XGBoost</a:t>
+            </a:r>
+            <a:r>
+              <a:rPr lang="en-US" sz="2400" b="1" dirty="0">
+                <a:latin typeface="EB Garamond"/>
+                <a:ea typeface="EB Garamond"/>
+              </a:rPr>
+              <a:t> without China Data</a:t>
+            </a:r>
+            <a:endParaRPr lang="en-US" sz="4800" b="1" dirty="0">
+              <a:latin typeface="EB Garamond"/>
+              <a:ea typeface="EB Garamond"/>
+            </a:endParaRPr>
+          </a:p>
+          <a:p>
+            <a:endParaRPr lang="en-US" sz="4800" b="1" dirty="0">
+              <a:latin typeface="EB Garamond"/>
+              <a:ea typeface="EB Garamond"/>
+            </a:endParaRPr>
+          </a:p>
+        </p:txBody>
+      </p:sp>
+      <p:pic>
+        <p:nvPicPr>
+          <p:cNvPr id="4" name="Picture 3">
+            <a:extLst>
+              <a:ext uri="{FF2B5EF4-FFF2-40B4-BE49-F238E27FC236}">
+                <a16:creationId xmlns:a16="http://schemas.microsoft.com/office/drawing/2014/main" id="{0EE5C75D-C5DA-F8DE-E2C7-E458F23D09CC}"/>
+              </a:ext>
+            </a:extLst>
+          </p:cNvPr>
+          <p:cNvPicPr>
+            <a:picLocks noChangeAspect="1"/>
+          </p:cNvPicPr>
+          <p:nvPr/>
+        </p:nvPicPr>
+        <p:blipFill>
+          <a:blip r:embed="rId3"/>
+          <a:stretch>
+            <a:fillRect/>
+          </a:stretch>
+        </p:blipFill>
+        <p:spPr>
+          <a:xfrm>
+            <a:off x="2638927" y="2289125"/>
+            <a:ext cx="6352673" cy="4105275"/>
+          </a:xfrm>
+          <a:prstGeom prst="rect">
+            <a:avLst/>
+          </a:prstGeom>
+        </p:spPr>
+      </p:pic>
+      <p:sp>
+        <p:nvSpPr>
+          <p:cNvPr id="6" name="Text Placeholder 5">
+            <a:extLst>
+              <a:ext uri="{FF2B5EF4-FFF2-40B4-BE49-F238E27FC236}">
+                <a16:creationId xmlns:a16="http://schemas.microsoft.com/office/drawing/2014/main" id="{387E0E1D-0915-C2A4-D999-D50EBCB8AFA6}"/>
+              </a:ext>
+            </a:extLst>
+          </p:cNvPr>
+          <p:cNvSpPr>
+            <a:spLocks noGrp="1"/>
+          </p:cNvSpPr>
+          <p:nvPr>
+            <p:ph type="body" idx="1"/>
+          </p:nvPr>
+        </p:nvSpPr>
+        <p:spPr/>
+        <p:txBody>
+          <a:bodyPr/>
+          <a:lstStyle/>
+          <a:p>
+            <a:r>
+              <a:rPr lang="en-US" sz="1200" dirty="0"/>
+              <a:t>China Covid data is not </a:t>
+            </a:r>
+            <a:r>
+              <a:rPr lang="en-US" sz="1200"/>
+              <a:t>that accurate so </a:t>
+            </a:r>
+            <a:r>
+              <a:rPr lang="en-US" sz="1200" dirty="0"/>
+              <a:t>we are trying to remove China data and try to implement the XG boost model</a:t>
+            </a:r>
+          </a:p>
+        </p:txBody>
+      </p:sp>
+    </p:spTree>
+    <p:extLst>
+      <p:ext uri="{BB962C8B-B14F-4D97-AF65-F5344CB8AC3E}">
+        <p14:creationId xmlns:p14="http://schemas.microsoft.com/office/powerpoint/2010/main" val="3906371468"/>
+      </p:ext>
+    </p:extLst>
+  </p:cSld>
+  <p:clrMapOvr>
+    <a:masterClrMapping/>
+  </p:clrMapOvr>
+</p:sld>
+</file>
+
+<file path=ppt/slides/slide32.xml><?xml version="1.0" encoding="utf-8"?>
 <p:sld xmlns:a="http://schemas.openxmlformats.org/drawingml/2006/main" xmlns:r="http://schemas.openxmlformats.org/officeDocument/2006/relationships" xmlns:p="http://schemas.openxmlformats.org/presentationml/2006/main">
   <p:cSld>
     <p:spTree>

</xml_diff>